<commit_message>
change hero section and slide dots
</commit_message>
<xml_diff>
--- a/Presentation1.pptx
+++ b/Presentation1.pptx
@@ -6,6 +6,7 @@
   </p:sldMasterIdLst>
   <p:sldIdLst>
     <p:sldId id="256" r:id="rId2"/>
+    <p:sldId id="257" r:id="rId3"/>
   </p:sldIdLst>
   <p:sldSz cx="12192000" cy="6858000"/>
   <p:notesSz cx="6858000" cy="9144000"/>
@@ -104,6 +105,11 @@
       </a:defRPr>
     </a:lvl9pPr>
   </p:defaultTextStyle>
+  <p:extLst>
+    <p:ext uri="{EFAFB233-063F-42B5-8137-9DF3F51BA10A}">
+      <p15:sldGuideLst xmlns:p15="http://schemas.microsoft.com/office/powerpoint/2012/main"/>
+    </p:ext>
+  </p:extLst>
 </p:presentation>
 </file>
 
@@ -256,7 +262,7 @@
           <a:p>
             <a:fld id="{5E350DAD-C5B5-4394-BE81-C3A2F3D5C1F7}" type="datetimeFigureOut">
               <a:rPr lang="en-IN" smtClean="0"/>
-              <a:t>02-12-2023</a:t>
+              <a:t>04-12-2023</a:t>
             </a:fld>
             <a:endParaRPr lang="en-IN"/>
           </a:p>
@@ -456,7 +462,7 @@
           <a:p>
             <a:fld id="{5E350DAD-C5B5-4394-BE81-C3A2F3D5C1F7}" type="datetimeFigureOut">
               <a:rPr lang="en-IN" smtClean="0"/>
-              <a:t>02-12-2023</a:t>
+              <a:t>04-12-2023</a:t>
             </a:fld>
             <a:endParaRPr lang="en-IN"/>
           </a:p>
@@ -666,7 +672,7 @@
           <a:p>
             <a:fld id="{5E350DAD-C5B5-4394-BE81-C3A2F3D5C1F7}" type="datetimeFigureOut">
               <a:rPr lang="en-IN" smtClean="0"/>
-              <a:t>02-12-2023</a:t>
+              <a:t>04-12-2023</a:t>
             </a:fld>
             <a:endParaRPr lang="en-IN"/>
           </a:p>
@@ -866,7 +872,7 @@
           <a:p>
             <a:fld id="{5E350DAD-C5B5-4394-BE81-C3A2F3D5C1F7}" type="datetimeFigureOut">
               <a:rPr lang="en-IN" smtClean="0"/>
-              <a:t>02-12-2023</a:t>
+              <a:t>04-12-2023</a:t>
             </a:fld>
             <a:endParaRPr lang="en-IN"/>
           </a:p>
@@ -1142,7 +1148,7 @@
           <a:p>
             <a:fld id="{5E350DAD-C5B5-4394-BE81-C3A2F3D5C1F7}" type="datetimeFigureOut">
               <a:rPr lang="en-IN" smtClean="0"/>
-              <a:t>02-12-2023</a:t>
+              <a:t>04-12-2023</a:t>
             </a:fld>
             <a:endParaRPr lang="en-IN"/>
           </a:p>
@@ -1410,7 +1416,7 @@
           <a:p>
             <a:fld id="{5E350DAD-C5B5-4394-BE81-C3A2F3D5C1F7}" type="datetimeFigureOut">
               <a:rPr lang="en-IN" smtClean="0"/>
-              <a:t>02-12-2023</a:t>
+              <a:t>04-12-2023</a:t>
             </a:fld>
             <a:endParaRPr lang="en-IN"/>
           </a:p>
@@ -1825,7 +1831,7 @@
           <a:p>
             <a:fld id="{5E350DAD-C5B5-4394-BE81-C3A2F3D5C1F7}" type="datetimeFigureOut">
               <a:rPr lang="en-IN" smtClean="0"/>
-              <a:t>02-12-2023</a:t>
+              <a:t>04-12-2023</a:t>
             </a:fld>
             <a:endParaRPr lang="en-IN"/>
           </a:p>
@@ -1967,7 +1973,7 @@
           <a:p>
             <a:fld id="{5E350DAD-C5B5-4394-BE81-C3A2F3D5C1F7}" type="datetimeFigureOut">
               <a:rPr lang="en-IN" smtClean="0"/>
-              <a:t>02-12-2023</a:t>
+              <a:t>04-12-2023</a:t>
             </a:fld>
             <a:endParaRPr lang="en-IN"/>
           </a:p>
@@ -2080,7 +2086,7 @@
           <a:p>
             <a:fld id="{5E350DAD-C5B5-4394-BE81-C3A2F3D5C1F7}" type="datetimeFigureOut">
               <a:rPr lang="en-IN" smtClean="0"/>
-              <a:t>02-12-2023</a:t>
+              <a:t>04-12-2023</a:t>
             </a:fld>
             <a:endParaRPr lang="en-IN"/>
           </a:p>
@@ -2393,7 +2399,7 @@
           <a:p>
             <a:fld id="{5E350DAD-C5B5-4394-BE81-C3A2F3D5C1F7}" type="datetimeFigureOut">
               <a:rPr lang="en-IN" smtClean="0"/>
-              <a:t>02-12-2023</a:t>
+              <a:t>04-12-2023</a:t>
             </a:fld>
             <a:endParaRPr lang="en-IN"/>
           </a:p>
@@ -2682,7 +2688,7 @@
           <a:p>
             <a:fld id="{5E350DAD-C5B5-4394-BE81-C3A2F3D5C1F7}" type="datetimeFigureOut">
               <a:rPr lang="en-IN" smtClean="0"/>
-              <a:t>02-12-2023</a:t>
+              <a:t>04-12-2023</a:t>
             </a:fld>
             <a:endParaRPr lang="en-IN"/>
           </a:p>
@@ -2925,7 +2931,7 @@
           <a:p>
             <a:fld id="{5E350DAD-C5B5-4394-BE81-C3A2F3D5C1F7}" type="datetimeFigureOut">
               <a:rPr lang="en-IN" smtClean="0"/>
-              <a:t>02-12-2023</a:t>
+              <a:t>04-12-2023</a:t>
             </a:fld>
             <a:endParaRPr lang="en-IN"/>
           </a:p>
@@ -3443,10 +3449,10 @@
       </p:sp>
       <p:grpSp>
         <p:nvGrpSpPr>
-          <p:cNvPr id="34" name="Group 33">
-            <a:extLst>
-              <a:ext uri="{FF2B5EF4-FFF2-40B4-BE49-F238E27FC236}">
-                <a16:creationId xmlns:a16="http://schemas.microsoft.com/office/drawing/2014/main" id="{4E6EEE54-232C-DCD5-06AC-24C9459ECF07}"/>
+          <p:cNvPr id="4" name="Group 3">
+            <a:extLst>
+              <a:ext uri="{FF2B5EF4-FFF2-40B4-BE49-F238E27FC236}">
+                <a16:creationId xmlns:a16="http://schemas.microsoft.com/office/drawing/2014/main" id="{1DD1E4CB-925C-BC7A-0528-A9B107984F5E}"/>
               </a:ext>
             </a:extLst>
           </p:cNvPr>
@@ -3457,7 +3463,7 @@
           <a:xfrm>
             <a:off x="-89647" y="122223"/>
             <a:ext cx="12192000" cy="6331712"/>
-            <a:chOff x="0" y="310482"/>
+            <a:chOff x="-89647" y="122223"/>
             <a:chExt cx="12192000" cy="6331712"/>
           </a:xfrm>
         </p:grpSpPr>
@@ -3489,7 +3495,7 @@
           </p:blipFill>
           <p:spPr>
             <a:xfrm>
-              <a:off x="0" y="310482"/>
+              <a:off x="-89647" y="122223"/>
               <a:ext cx="12192000" cy="6331712"/>
             </a:xfrm>
             <a:prstGeom prst="rect">
@@ -3528,7 +3534,7 @@
           </p:blipFill>
           <p:spPr>
             <a:xfrm>
-              <a:off x="8110257" y="2837298"/>
+              <a:off x="8020610" y="2649039"/>
               <a:ext cx="360000" cy="360000"/>
             </a:xfrm>
             <a:prstGeom prst="rect">
@@ -3567,7 +3573,7 @@
           </p:blipFill>
           <p:spPr>
             <a:xfrm>
-              <a:off x="9839044" y="4806922"/>
+              <a:off x="9749397" y="4618663"/>
               <a:ext cx="360000" cy="360000"/>
             </a:xfrm>
             <a:prstGeom prst="rect">
@@ -3606,7 +3612,7 @@
           </p:blipFill>
           <p:spPr>
             <a:xfrm>
-              <a:off x="7104414" y="3012117"/>
+              <a:off x="7014767" y="2823858"/>
               <a:ext cx="360000" cy="360000"/>
             </a:xfrm>
             <a:prstGeom prst="rect">
@@ -3645,7 +3651,7 @@
           </p:blipFill>
           <p:spPr>
             <a:xfrm>
-              <a:off x="5829971" y="3497091"/>
+              <a:off x="5740324" y="3308832"/>
               <a:ext cx="360000" cy="360000"/>
             </a:xfrm>
             <a:prstGeom prst="rect">
@@ -3684,7 +3690,7 @@
           </p:blipFill>
           <p:spPr>
             <a:xfrm>
-              <a:off x="6333231" y="3201180"/>
+              <a:off x="6243584" y="3012921"/>
               <a:ext cx="360000" cy="360000"/>
             </a:xfrm>
             <a:prstGeom prst="rect">
@@ -3723,7 +3729,7 @@
           </p:blipFill>
           <p:spPr>
             <a:xfrm>
-              <a:off x="5943429" y="1696202"/>
+              <a:off x="5853782" y="1507943"/>
               <a:ext cx="360000" cy="360000"/>
             </a:xfrm>
             <a:prstGeom prst="rect">
@@ -3762,7 +3768,7 @@
           </p:blipFill>
           <p:spPr>
             <a:xfrm>
-              <a:off x="9163721" y="3198381"/>
+              <a:off x="9074074" y="3010122"/>
               <a:ext cx="360000" cy="360000"/>
             </a:xfrm>
             <a:prstGeom prst="rect">
@@ -3801,7 +3807,7 @@
           </p:blipFill>
           <p:spPr>
             <a:xfrm>
-              <a:off x="2372397" y="1456200"/>
+              <a:off x="2282750" y="1267941"/>
               <a:ext cx="360000" cy="360000"/>
             </a:xfrm>
             <a:prstGeom prst="rect">
@@ -3840,7 +3846,7 @@
           </p:blipFill>
           <p:spPr>
             <a:xfrm>
-              <a:off x="1412618" y="1809378"/>
+              <a:off x="1322971" y="1621119"/>
               <a:ext cx="360000" cy="360000"/>
             </a:xfrm>
             <a:prstGeom prst="rect">
@@ -3879,7 +3885,7 @@
           </p:blipFill>
           <p:spPr>
             <a:xfrm>
-              <a:off x="1452000" y="2100163"/>
+              <a:off x="1362353" y="1911904"/>
               <a:ext cx="432000" cy="432000"/>
             </a:xfrm>
             <a:prstGeom prst="rect">
@@ -3918,7 +3924,7 @@
           </p:blipFill>
           <p:spPr>
             <a:xfrm>
-              <a:off x="8290257" y="3055960"/>
+              <a:off x="8200610" y="2867701"/>
               <a:ext cx="432000" cy="432000"/>
             </a:xfrm>
             <a:prstGeom prst="rect">
@@ -3940,7 +3946,7 @@
           </p:nvSpPr>
           <p:spPr>
             <a:xfrm>
-              <a:off x="7875597" y="3171151"/>
+              <a:off x="7785950" y="2982892"/>
               <a:ext cx="1284641" cy="430887"/>
             </a:xfrm>
             <a:prstGeom prst="rect">
@@ -3989,7 +3995,7 @@
           </p:nvGrpSpPr>
           <p:grpSpPr>
             <a:xfrm>
-              <a:off x="814460" y="3677091"/>
+              <a:off x="724813" y="3488832"/>
               <a:ext cx="3115873" cy="923330"/>
               <a:chOff x="2751638" y="3116338"/>
               <a:chExt cx="3022642" cy="923330"/>
@@ -4155,6 +4161,771 @@
     <p:extLst>
       <p:ext uri="{BB962C8B-B14F-4D97-AF65-F5344CB8AC3E}">
         <p14:creationId xmlns:p14="http://schemas.microsoft.com/office/powerpoint/2010/main" val="3625993473"/>
+      </p:ext>
+    </p:extLst>
+  </p:cSld>
+  <p:clrMapOvr>
+    <a:masterClrMapping/>
+  </p:clrMapOvr>
+</p:sld>
+</file>
+
+<file path=ppt/slides/slide2.xml><?xml version="1.0" encoding="utf-8"?>
+<p:sld xmlns:a="http://schemas.openxmlformats.org/drawingml/2006/main" xmlns:r="http://schemas.openxmlformats.org/officeDocument/2006/relationships" xmlns:p="http://schemas.openxmlformats.org/presentationml/2006/main">
+  <p:cSld>
+    <p:spTree>
+      <p:nvGrpSpPr>
+        <p:cNvPr id="1" name=""/>
+        <p:cNvGrpSpPr/>
+        <p:nvPr/>
+      </p:nvGrpSpPr>
+      <p:grpSpPr>
+        <a:xfrm>
+          <a:off x="0" y="0"/>
+          <a:ext cx="0" cy="0"/>
+          <a:chOff x="0" y="0"/>
+          <a:chExt cx="0" cy="0"/>
+        </a:xfrm>
+      </p:grpSpPr>
+      <p:grpSp>
+        <p:nvGrpSpPr>
+          <p:cNvPr id="2" name="Group 1">
+            <a:extLst>
+              <a:ext uri="{FF2B5EF4-FFF2-40B4-BE49-F238E27FC236}">
+                <a16:creationId xmlns:a16="http://schemas.microsoft.com/office/drawing/2014/main" id="{97AAFB91-6190-5791-1CA5-189223CFFC4B}"/>
+              </a:ext>
+            </a:extLst>
+          </p:cNvPr>
+          <p:cNvGrpSpPr/>
+          <p:nvPr/>
+        </p:nvGrpSpPr>
+        <p:grpSpPr>
+          <a:xfrm>
+            <a:off x="2344270" y="0"/>
+            <a:ext cx="6858000" cy="6858000"/>
+            <a:chOff x="2667000" y="0"/>
+            <a:chExt cx="6858000" cy="6858000"/>
+          </a:xfrm>
+        </p:grpSpPr>
+        <p:grpSp>
+          <p:nvGrpSpPr>
+            <p:cNvPr id="32" name="Group 31">
+              <a:extLst>
+                <a:ext uri="{FF2B5EF4-FFF2-40B4-BE49-F238E27FC236}">
+                  <a16:creationId xmlns:a16="http://schemas.microsoft.com/office/drawing/2014/main" id="{705932F2-3D90-2DAB-B05D-28082D8669E9}"/>
+                </a:ext>
+              </a:extLst>
+            </p:cNvPr>
+            <p:cNvGrpSpPr/>
+            <p:nvPr/>
+          </p:nvGrpSpPr>
+          <p:grpSpPr>
+            <a:xfrm>
+              <a:off x="2667000" y="0"/>
+              <a:ext cx="6858000" cy="6858000"/>
+              <a:chOff x="2667000" y="0"/>
+              <a:chExt cx="6858000" cy="6858000"/>
+            </a:xfrm>
+          </p:grpSpPr>
+          <p:pic>
+            <p:nvPicPr>
+              <p:cNvPr id="5" name="Picture 4">
+                <a:extLst>
+                  <a:ext uri="{FF2B5EF4-FFF2-40B4-BE49-F238E27FC236}">
+                    <a16:creationId xmlns:a16="http://schemas.microsoft.com/office/drawing/2014/main" id="{653FD7C0-4588-907B-029A-C78F3F562F45}"/>
+                  </a:ext>
+                </a:extLst>
+              </p:cNvPr>
+              <p:cNvPicPr>
+                <a:picLocks noChangeAspect="1"/>
+              </p:cNvPicPr>
+              <p:nvPr/>
+            </p:nvPicPr>
+            <p:blipFill>
+              <a:blip r:embed="rId2">
+                <a:extLst>
+                  <a:ext uri="{28A0092B-C50C-407E-A947-70E740481C1C}">
+                    <a14:useLocalDpi xmlns:a14="http://schemas.microsoft.com/office/drawing/2010/main" val="0"/>
+                  </a:ext>
+                </a:extLst>
+              </a:blip>
+              <a:stretch>
+                <a:fillRect/>
+              </a:stretch>
+            </p:blipFill>
+            <p:spPr>
+              <a:xfrm>
+                <a:off x="2667000" y="0"/>
+                <a:ext cx="6858000" cy="6858000"/>
+              </a:xfrm>
+              <a:prstGeom prst="rect">
+                <a:avLst/>
+              </a:prstGeom>
+            </p:spPr>
+          </p:pic>
+          <p:pic>
+            <p:nvPicPr>
+              <p:cNvPr id="8" name="Graphic 7" descr="Marker">
+                <a:extLst>
+                  <a:ext uri="{FF2B5EF4-FFF2-40B4-BE49-F238E27FC236}">
+                    <a16:creationId xmlns:a16="http://schemas.microsoft.com/office/drawing/2014/main" id="{8ABD66CA-F85C-81B0-D8AC-0858F48ECD79}"/>
+                  </a:ext>
+                </a:extLst>
+              </p:cNvPr>
+              <p:cNvPicPr>
+                <a:picLocks noChangeAspect="1"/>
+              </p:cNvPicPr>
+              <p:nvPr/>
+            </p:nvPicPr>
+            <p:blipFill>
+              <a:blip r:embed="rId3">
+                <a:extLst>
+                  <a:ext uri="{28A0092B-C50C-407E-A947-70E740481C1C}">
+                    <a14:useLocalDpi xmlns:a14="http://schemas.microsoft.com/office/drawing/2010/main" val="0"/>
+                  </a:ext>
+                  <a:ext uri="{96DAC541-7B7A-43D3-8B79-37D633B846F1}">
+                    <asvg:svgBlip xmlns:asvg="http://schemas.microsoft.com/office/drawing/2016/SVG/main" r:embed="rId4"/>
+                  </a:ext>
+                </a:extLst>
+              </a:blip>
+              <a:stretch>
+                <a:fillRect/>
+              </a:stretch>
+            </p:blipFill>
+            <p:spPr>
+              <a:xfrm>
+                <a:off x="7163937" y="3377164"/>
+                <a:ext cx="216000" cy="216000"/>
+              </a:xfrm>
+              <a:prstGeom prst="rect">
+                <a:avLst/>
+              </a:prstGeom>
+            </p:spPr>
+          </p:pic>
+          <p:pic>
+            <p:nvPicPr>
+              <p:cNvPr id="15" name="Graphic 14" descr="Flag">
+                <a:extLst>
+                  <a:ext uri="{FF2B5EF4-FFF2-40B4-BE49-F238E27FC236}">
+                    <a16:creationId xmlns:a16="http://schemas.microsoft.com/office/drawing/2014/main" id="{B507EF67-3122-116B-6D30-9E53B5E2ED51}"/>
+                  </a:ext>
+                </a:extLst>
+              </p:cNvPr>
+              <p:cNvPicPr>
+                <a:picLocks noChangeAspect="1"/>
+              </p:cNvPicPr>
+              <p:nvPr/>
+            </p:nvPicPr>
+            <p:blipFill>
+              <a:blip r:embed="rId5">
+                <a:extLst>
+                  <a:ext uri="{28A0092B-C50C-407E-A947-70E740481C1C}">
+                    <a14:useLocalDpi xmlns:a14="http://schemas.microsoft.com/office/drawing/2010/main" val="0"/>
+                  </a:ext>
+                  <a:ext uri="{96DAC541-7B7A-43D3-8B79-37D633B846F1}">
+                    <asvg:svgBlip xmlns:asvg="http://schemas.microsoft.com/office/drawing/2016/SVG/main" r:embed="rId6"/>
+                  </a:ext>
+                </a:extLst>
+              </a:blip>
+              <a:stretch>
+                <a:fillRect/>
+              </a:stretch>
+            </p:blipFill>
+            <p:spPr>
+              <a:xfrm>
+                <a:off x="7269801" y="3455450"/>
+                <a:ext cx="252000" cy="252000"/>
+              </a:xfrm>
+              <a:prstGeom prst="rect">
+                <a:avLst/>
+              </a:prstGeom>
+            </p:spPr>
+          </p:pic>
+          <p:grpSp>
+            <p:nvGrpSpPr>
+              <p:cNvPr id="16" name="Group 15">
+                <a:extLst>
+                  <a:ext uri="{FF2B5EF4-FFF2-40B4-BE49-F238E27FC236}">
+                    <a16:creationId xmlns:a16="http://schemas.microsoft.com/office/drawing/2014/main" id="{04EEA944-25FA-7B29-647B-9C9DF84FD0E5}"/>
+                  </a:ext>
+                </a:extLst>
+              </p:cNvPr>
+              <p:cNvGrpSpPr/>
+              <p:nvPr/>
+            </p:nvGrpSpPr>
+            <p:grpSpPr>
+              <a:xfrm>
+                <a:off x="2737909" y="3961736"/>
+                <a:ext cx="3115873" cy="861774"/>
+                <a:chOff x="2751638" y="3116338"/>
+                <a:chExt cx="3022642" cy="861774"/>
+              </a:xfrm>
+            </p:grpSpPr>
+            <p:sp>
+              <p:nvSpPr>
+                <p:cNvPr id="17" name="TextBox 16">
+                  <a:extLst>
+                    <a:ext uri="{FF2B5EF4-FFF2-40B4-BE49-F238E27FC236}">
+                      <a16:creationId xmlns:a16="http://schemas.microsoft.com/office/drawing/2014/main" id="{69BD78CE-2DD5-DB09-053A-54920C641A30}"/>
+                    </a:ext>
+                  </a:extLst>
+                </p:cNvPr>
+                <p:cNvSpPr txBox="1"/>
+                <p:nvPr/>
+              </p:nvSpPr>
+              <p:spPr>
+                <a:xfrm>
+                  <a:off x="3034890" y="3116338"/>
+                  <a:ext cx="2739390" cy="861774"/>
+                </a:xfrm>
+                <a:prstGeom prst="rect">
+                  <a:avLst/>
+                </a:prstGeom>
+                <a:noFill/>
+              </p:spPr>
+              <p:txBody>
+                <a:bodyPr wrap="square">
+                  <a:spAutoFit/>
+                </a:bodyPr>
+                <a:lstStyle/>
+                <a:p>
+                  <a:r>
+                    <a:rPr lang="en-GB" sz="1200" b="1" dirty="0"/>
+                    <a:t>Work locations</a:t>
+                  </a:r>
+                </a:p>
+                <a:p>
+                  <a:endParaRPr lang="en-GB" sz="1200" b="1" dirty="0"/>
+                </a:p>
+                <a:p>
+                  <a:r>
+                    <a:rPr lang="en-GB" sz="1200" b="1" dirty="0"/>
+                    <a:t> Registered Office</a:t>
+                  </a:r>
+                  <a:endParaRPr lang="en-GB" sz="1400" b="1" dirty="0"/>
+                </a:p>
+                <a:p>
+                  <a:r>
+                    <a:rPr lang="en-GB" sz="1200" b="1" dirty="0"/>
+                    <a:t> Location</a:t>
+                  </a:r>
+                  <a:endParaRPr lang="en-IN" sz="1200" b="1" dirty="0"/>
+                </a:p>
+              </p:txBody>
+            </p:sp>
+            <p:pic>
+              <p:nvPicPr>
+                <p:cNvPr id="18" name="Graphic 17" descr="Flag">
+                  <a:extLst>
+                    <a:ext uri="{FF2B5EF4-FFF2-40B4-BE49-F238E27FC236}">
+                      <a16:creationId xmlns:a16="http://schemas.microsoft.com/office/drawing/2014/main" id="{1BFB3366-8128-4DFB-A8B1-D886764395C2}"/>
+                    </a:ext>
+                  </a:extLst>
+                </p:cNvPr>
+                <p:cNvPicPr>
+                  <a:picLocks noChangeAspect="1"/>
+                </p:cNvPicPr>
+                <p:nvPr/>
+              </p:nvPicPr>
+              <p:blipFill>
+                <a:blip r:embed="rId5">
+                  <a:extLst>
+                    <a:ext uri="{28A0092B-C50C-407E-A947-70E740481C1C}">
+                      <a14:useLocalDpi xmlns:a14="http://schemas.microsoft.com/office/drawing/2010/main" val="0"/>
+                    </a:ext>
+                    <a:ext uri="{96DAC541-7B7A-43D3-8B79-37D633B846F1}">
+                      <asvg:svgBlip xmlns:asvg="http://schemas.microsoft.com/office/drawing/2016/SVG/main" r:embed="rId6"/>
+                    </a:ext>
+                  </a:extLst>
+                </a:blip>
+                <a:stretch>
+                  <a:fillRect/>
+                </a:stretch>
+              </p:blipFill>
+              <p:spPr>
+                <a:xfrm>
+                  <a:off x="2817199" y="3541082"/>
+                  <a:ext cx="324000" cy="324000"/>
+                </a:xfrm>
+                <a:prstGeom prst="rect">
+                  <a:avLst/>
+                </a:prstGeom>
+              </p:spPr>
+            </p:pic>
+            <p:pic>
+              <p:nvPicPr>
+                <p:cNvPr id="19" name="Graphic 18" descr="Marker">
+                  <a:extLst>
+                    <a:ext uri="{FF2B5EF4-FFF2-40B4-BE49-F238E27FC236}">
+                      <a16:creationId xmlns:a16="http://schemas.microsoft.com/office/drawing/2014/main" id="{78980E23-F869-BF5F-A4AB-CA85B2BFB8E0}"/>
+                    </a:ext>
+                  </a:extLst>
+                </p:cNvPr>
+                <p:cNvPicPr>
+                  <a:picLocks noChangeAspect="1"/>
+                </p:cNvPicPr>
+                <p:nvPr/>
+              </p:nvPicPr>
+              <p:blipFill>
+                <a:blip r:embed="rId7">
+                  <a:extLst>
+                    <a:ext uri="{28A0092B-C50C-407E-A947-70E740481C1C}">
+                      <a14:useLocalDpi xmlns:a14="http://schemas.microsoft.com/office/drawing/2010/main" val="0"/>
+                    </a:ext>
+                    <a:ext uri="{96DAC541-7B7A-43D3-8B79-37D633B846F1}">
+                      <asvg:svgBlip xmlns:asvg="http://schemas.microsoft.com/office/drawing/2016/SVG/main" r:embed="rId8"/>
+                    </a:ext>
+                  </a:extLst>
+                </a:blip>
+                <a:stretch>
+                  <a:fillRect/>
+                </a:stretch>
+              </p:blipFill>
+              <p:spPr>
+                <a:xfrm>
+                  <a:off x="2751638" y="3116338"/>
+                  <a:ext cx="360000" cy="360000"/>
+                </a:xfrm>
+                <a:prstGeom prst="rect">
+                  <a:avLst/>
+                </a:prstGeom>
+              </p:spPr>
+            </p:pic>
+          </p:grpSp>
+          <p:pic>
+            <p:nvPicPr>
+              <p:cNvPr id="20" name="Graphic 19" descr="Marker">
+                <a:extLst>
+                  <a:ext uri="{FF2B5EF4-FFF2-40B4-BE49-F238E27FC236}">
+                    <a16:creationId xmlns:a16="http://schemas.microsoft.com/office/drawing/2014/main" id="{29D51062-AC80-AE82-FD9F-500F992977FB}"/>
+                  </a:ext>
+                </a:extLst>
+              </p:cNvPr>
+              <p:cNvPicPr>
+                <a:picLocks noChangeAspect="1"/>
+              </p:cNvPicPr>
+              <p:nvPr/>
+            </p:nvPicPr>
+            <p:blipFill>
+              <a:blip r:embed="rId3">
+                <a:extLst>
+                  <a:ext uri="{28A0092B-C50C-407E-A947-70E740481C1C}">
+                    <a14:useLocalDpi xmlns:a14="http://schemas.microsoft.com/office/drawing/2010/main" val="0"/>
+                  </a:ext>
+                  <a:ext uri="{96DAC541-7B7A-43D3-8B79-37D633B846F1}">
+                    <asvg:svgBlip xmlns:asvg="http://schemas.microsoft.com/office/drawing/2016/SVG/main" r:embed="rId4"/>
+                  </a:ext>
+                </a:extLst>
+              </a:blip>
+              <a:stretch>
+                <a:fillRect/>
+              </a:stretch>
+            </p:blipFill>
+            <p:spPr>
+              <a:xfrm>
+                <a:off x="6659761" y="3440232"/>
+                <a:ext cx="166186" cy="166186"/>
+              </a:xfrm>
+              <a:prstGeom prst="rect">
+                <a:avLst/>
+              </a:prstGeom>
+            </p:spPr>
+          </p:pic>
+          <p:pic>
+            <p:nvPicPr>
+              <p:cNvPr id="21" name="Graphic 20" descr="Marker">
+                <a:extLst>
+                  <a:ext uri="{FF2B5EF4-FFF2-40B4-BE49-F238E27FC236}">
+                    <a16:creationId xmlns:a16="http://schemas.microsoft.com/office/drawing/2014/main" id="{32EDCFE5-CB14-F637-A555-EB365F39415C}"/>
+                  </a:ext>
+                </a:extLst>
+              </p:cNvPr>
+              <p:cNvPicPr>
+                <a:picLocks noChangeAspect="1"/>
+              </p:cNvPicPr>
+              <p:nvPr/>
+            </p:nvPicPr>
+            <p:blipFill>
+              <a:blip r:embed="rId3">
+                <a:extLst>
+                  <a:ext uri="{28A0092B-C50C-407E-A947-70E740481C1C}">
+                    <a14:useLocalDpi xmlns:a14="http://schemas.microsoft.com/office/drawing/2010/main" val="0"/>
+                  </a:ext>
+                  <a:ext uri="{96DAC541-7B7A-43D3-8B79-37D633B846F1}">
+                    <asvg:svgBlip xmlns:asvg="http://schemas.microsoft.com/office/drawing/2016/SVG/main" r:embed="rId4"/>
+                  </a:ext>
+                </a:extLst>
+              </a:blip>
+              <a:stretch>
+                <a:fillRect/>
+              </a:stretch>
+            </p:blipFill>
+            <p:spPr>
+              <a:xfrm>
+                <a:off x="6223438" y="3435589"/>
+                <a:ext cx="166186" cy="166186"/>
+              </a:xfrm>
+              <a:prstGeom prst="rect">
+                <a:avLst/>
+              </a:prstGeom>
+            </p:spPr>
+          </p:pic>
+          <p:pic>
+            <p:nvPicPr>
+              <p:cNvPr id="22" name="Graphic 21" descr="Marker">
+                <a:extLst>
+                  <a:ext uri="{FF2B5EF4-FFF2-40B4-BE49-F238E27FC236}">
+                    <a16:creationId xmlns:a16="http://schemas.microsoft.com/office/drawing/2014/main" id="{DACA0389-F59E-9BD2-4C5C-178A6F211AD4}"/>
+                  </a:ext>
+                </a:extLst>
+              </p:cNvPr>
+              <p:cNvPicPr>
+                <a:picLocks noChangeAspect="1"/>
+              </p:cNvPicPr>
+              <p:nvPr/>
+            </p:nvPicPr>
+            <p:blipFill>
+              <a:blip r:embed="rId3">
+                <a:extLst>
+                  <a:ext uri="{28A0092B-C50C-407E-A947-70E740481C1C}">
+                    <a14:useLocalDpi xmlns:a14="http://schemas.microsoft.com/office/drawing/2010/main" val="0"/>
+                  </a:ext>
+                  <a:ext uri="{96DAC541-7B7A-43D3-8B79-37D633B846F1}">
+                    <asvg:svgBlip xmlns:asvg="http://schemas.microsoft.com/office/drawing/2016/SVG/main" r:embed="rId4"/>
+                  </a:ext>
+                </a:extLst>
+              </a:blip>
+              <a:stretch>
+                <a:fillRect/>
+              </a:stretch>
+            </p:blipFill>
+            <p:spPr>
+              <a:xfrm>
+                <a:off x="6012907" y="3693878"/>
+                <a:ext cx="166186" cy="166186"/>
+              </a:xfrm>
+              <a:prstGeom prst="rect">
+                <a:avLst/>
+              </a:prstGeom>
+            </p:spPr>
+          </p:pic>
+          <p:pic>
+            <p:nvPicPr>
+              <p:cNvPr id="23" name="Graphic 22" descr="Marker">
+                <a:extLst>
+                  <a:ext uri="{FF2B5EF4-FFF2-40B4-BE49-F238E27FC236}">
+                    <a16:creationId xmlns:a16="http://schemas.microsoft.com/office/drawing/2014/main" id="{2567FA1D-E3A4-F62E-3CFF-CFAF55D009A9}"/>
+                  </a:ext>
+                </a:extLst>
+              </p:cNvPr>
+              <p:cNvPicPr>
+                <a:picLocks noChangeAspect="1"/>
+              </p:cNvPicPr>
+              <p:nvPr/>
+            </p:nvPicPr>
+            <p:blipFill>
+              <a:blip r:embed="rId3">
+                <a:extLst>
+                  <a:ext uri="{28A0092B-C50C-407E-A947-70E740481C1C}">
+                    <a14:useLocalDpi xmlns:a14="http://schemas.microsoft.com/office/drawing/2010/main" val="0"/>
+                  </a:ext>
+                  <a:ext uri="{96DAC541-7B7A-43D3-8B79-37D633B846F1}">
+                    <asvg:svgBlip xmlns:asvg="http://schemas.microsoft.com/office/drawing/2016/SVG/main" r:embed="rId4"/>
+                  </a:ext>
+                </a:extLst>
+              </a:blip>
+              <a:stretch>
+                <a:fillRect/>
+              </a:stretch>
+            </p:blipFill>
+            <p:spPr>
+              <a:xfrm>
+                <a:off x="7746198" y="3562547"/>
+                <a:ext cx="166186" cy="166186"/>
+              </a:xfrm>
+              <a:prstGeom prst="rect">
+                <a:avLst/>
+              </a:prstGeom>
+            </p:spPr>
+          </p:pic>
+          <p:pic>
+            <p:nvPicPr>
+              <p:cNvPr id="24" name="Graphic 23" descr="Marker">
+                <a:extLst>
+                  <a:ext uri="{FF2B5EF4-FFF2-40B4-BE49-F238E27FC236}">
+                    <a16:creationId xmlns:a16="http://schemas.microsoft.com/office/drawing/2014/main" id="{8F2454D1-F187-ACDA-A936-0D1A1B32DA3A}"/>
+                  </a:ext>
+                </a:extLst>
+              </p:cNvPr>
+              <p:cNvPicPr>
+                <a:picLocks noChangeAspect="1"/>
+              </p:cNvPicPr>
+              <p:nvPr/>
+            </p:nvPicPr>
+            <p:blipFill>
+              <a:blip r:embed="rId3">
+                <a:extLst>
+                  <a:ext uri="{28A0092B-C50C-407E-A947-70E740481C1C}">
+                    <a14:useLocalDpi xmlns:a14="http://schemas.microsoft.com/office/drawing/2010/main" val="0"/>
+                  </a:ext>
+                  <a:ext uri="{96DAC541-7B7A-43D3-8B79-37D633B846F1}">
+                    <asvg:svgBlip xmlns:asvg="http://schemas.microsoft.com/office/drawing/2016/SVG/main" r:embed="rId4"/>
+                  </a:ext>
+                </a:extLst>
+              </a:blip>
+              <a:stretch>
+                <a:fillRect/>
+              </a:stretch>
+            </p:blipFill>
+            <p:spPr>
+              <a:xfrm>
+                <a:off x="8185370" y="4214716"/>
+                <a:ext cx="166186" cy="166186"/>
+              </a:xfrm>
+              <a:prstGeom prst="rect">
+                <a:avLst/>
+              </a:prstGeom>
+            </p:spPr>
+          </p:pic>
+          <p:pic>
+            <p:nvPicPr>
+              <p:cNvPr id="25" name="Graphic 24" descr="Marker">
+                <a:extLst>
+                  <a:ext uri="{FF2B5EF4-FFF2-40B4-BE49-F238E27FC236}">
+                    <a16:creationId xmlns:a16="http://schemas.microsoft.com/office/drawing/2014/main" id="{8211BB10-7756-49C6-33F0-3795C3BBBCA0}"/>
+                  </a:ext>
+                </a:extLst>
+              </p:cNvPr>
+              <p:cNvPicPr>
+                <a:picLocks noChangeAspect="1"/>
+              </p:cNvPicPr>
+              <p:nvPr/>
+            </p:nvPicPr>
+            <p:blipFill>
+              <a:blip r:embed="rId3">
+                <a:extLst>
+                  <a:ext uri="{28A0092B-C50C-407E-A947-70E740481C1C}">
+                    <a14:useLocalDpi xmlns:a14="http://schemas.microsoft.com/office/drawing/2010/main" val="0"/>
+                  </a:ext>
+                  <a:ext uri="{96DAC541-7B7A-43D3-8B79-37D633B846F1}">
+                    <asvg:svgBlip xmlns:asvg="http://schemas.microsoft.com/office/drawing/2016/SVG/main" r:embed="rId4"/>
+                  </a:ext>
+                </a:extLst>
+              </a:blip>
+              <a:stretch>
+                <a:fillRect/>
+              </a:stretch>
+            </p:blipFill>
+            <p:spPr>
+              <a:xfrm>
+                <a:off x="6033782" y="2842853"/>
+                <a:ext cx="166186" cy="166186"/>
+              </a:xfrm>
+              <a:prstGeom prst="rect">
+                <a:avLst/>
+              </a:prstGeom>
+            </p:spPr>
+          </p:pic>
+          <p:pic>
+            <p:nvPicPr>
+              <p:cNvPr id="27" name="Graphic 26" descr="Marker">
+                <a:extLst>
+                  <a:ext uri="{FF2B5EF4-FFF2-40B4-BE49-F238E27FC236}">
+                    <a16:creationId xmlns:a16="http://schemas.microsoft.com/office/drawing/2014/main" id="{28456A1A-822D-3F83-6CA7-7B223D736908}"/>
+                  </a:ext>
+                </a:extLst>
+              </p:cNvPr>
+              <p:cNvPicPr>
+                <a:picLocks noChangeAspect="1"/>
+              </p:cNvPicPr>
+              <p:nvPr/>
+            </p:nvPicPr>
+            <p:blipFill>
+              <a:blip r:embed="rId3">
+                <a:extLst>
+                  <a:ext uri="{28A0092B-C50C-407E-A947-70E740481C1C}">
+                    <a14:useLocalDpi xmlns:a14="http://schemas.microsoft.com/office/drawing/2010/main" val="0"/>
+                  </a:ext>
+                  <a:ext uri="{96DAC541-7B7A-43D3-8B79-37D633B846F1}">
+                    <asvg:svgBlip xmlns:asvg="http://schemas.microsoft.com/office/drawing/2016/SVG/main" r:embed="rId4"/>
+                  </a:ext>
+                </a:extLst>
+              </a:blip>
+              <a:stretch>
+                <a:fillRect/>
+              </a:stretch>
+            </p:blipFill>
+            <p:spPr>
+              <a:xfrm>
+                <a:off x="4055672" y="2679519"/>
+                <a:ext cx="166186" cy="166186"/>
+              </a:xfrm>
+              <a:prstGeom prst="rect">
+                <a:avLst/>
+              </a:prstGeom>
+            </p:spPr>
+          </p:pic>
+          <p:sp>
+            <p:nvSpPr>
+              <p:cNvPr id="28" name="TextBox 27">
+                <a:extLst>
+                  <a:ext uri="{FF2B5EF4-FFF2-40B4-BE49-F238E27FC236}">
+                    <a16:creationId xmlns:a16="http://schemas.microsoft.com/office/drawing/2014/main" id="{47C63398-C648-89B0-CBBD-0BB07F34EC64}"/>
+                  </a:ext>
+                </a:extLst>
+              </p:cNvPr>
+              <p:cNvSpPr txBox="1"/>
+              <p:nvPr/>
+            </p:nvSpPr>
+            <p:spPr>
+              <a:xfrm>
+                <a:off x="6858674" y="3562547"/>
+                <a:ext cx="478016" cy="369332"/>
+              </a:xfrm>
+              <a:prstGeom prst="rect">
+                <a:avLst/>
+              </a:prstGeom>
+              <a:noFill/>
+            </p:spPr>
+            <p:txBody>
+              <a:bodyPr wrap="none" rtlCol="0">
+                <a:spAutoFit/>
+              </a:bodyPr>
+              <a:lstStyle/>
+              <a:p>
+                <a:r>
+                  <a:rPr lang="en-GB" sz="900" b="1" dirty="0"/>
+                  <a:t>PUNE </a:t>
+                </a:r>
+              </a:p>
+              <a:p>
+                <a:r>
+                  <a:rPr lang="en-GB" sz="900" b="1" dirty="0"/>
+                  <a:t>INDIA</a:t>
+                </a:r>
+                <a:endParaRPr lang="en-IN" sz="900" b="1" dirty="0"/>
+              </a:p>
+            </p:txBody>
+          </p:sp>
+          <p:pic>
+            <p:nvPicPr>
+              <p:cNvPr id="29" name="Graphic 28" descr="Flag">
+                <a:extLst>
+                  <a:ext uri="{FF2B5EF4-FFF2-40B4-BE49-F238E27FC236}">
+                    <a16:creationId xmlns:a16="http://schemas.microsoft.com/office/drawing/2014/main" id="{C547F301-8EEA-311D-EF49-0A0EE62D42E8}"/>
+                  </a:ext>
+                </a:extLst>
+              </p:cNvPr>
+              <p:cNvPicPr>
+                <a:picLocks noChangeAspect="1"/>
+              </p:cNvPicPr>
+              <p:nvPr/>
+            </p:nvPicPr>
+            <p:blipFill>
+              <a:blip r:embed="rId5">
+                <a:extLst>
+                  <a:ext uri="{28A0092B-C50C-407E-A947-70E740481C1C}">
+                    <a14:useLocalDpi xmlns:a14="http://schemas.microsoft.com/office/drawing/2010/main" val="0"/>
+                  </a:ext>
+                  <a:ext uri="{96DAC541-7B7A-43D3-8B79-37D633B846F1}">
+                    <asvg:svgBlip xmlns:asvg="http://schemas.microsoft.com/office/drawing/2016/SVG/main" r:embed="rId6"/>
+                  </a:ext>
+                </a:extLst>
+              </a:blip>
+              <a:stretch>
+                <a:fillRect/>
+              </a:stretch>
+            </p:blipFill>
+            <p:spPr>
+              <a:xfrm>
+                <a:off x="3643506" y="2923292"/>
+                <a:ext cx="252000" cy="252000"/>
+              </a:xfrm>
+              <a:prstGeom prst="rect">
+                <a:avLst/>
+              </a:prstGeom>
+            </p:spPr>
+          </p:pic>
+          <p:pic>
+            <p:nvPicPr>
+              <p:cNvPr id="30" name="Graphic 29" descr="Marker">
+                <a:extLst>
+                  <a:ext uri="{FF2B5EF4-FFF2-40B4-BE49-F238E27FC236}">
+                    <a16:creationId xmlns:a16="http://schemas.microsoft.com/office/drawing/2014/main" id="{46CB86C0-E736-E738-3B43-80F997D7809D}"/>
+                  </a:ext>
+                </a:extLst>
+              </p:cNvPr>
+              <p:cNvPicPr>
+                <a:picLocks noChangeAspect="1"/>
+              </p:cNvPicPr>
+              <p:nvPr/>
+            </p:nvPicPr>
+            <p:blipFill>
+              <a:blip r:embed="rId3">
+                <a:extLst>
+                  <a:ext uri="{28A0092B-C50C-407E-A947-70E740481C1C}">
+                    <a14:useLocalDpi xmlns:a14="http://schemas.microsoft.com/office/drawing/2010/main" val="0"/>
+                  </a:ext>
+                  <a:ext uri="{96DAC541-7B7A-43D3-8B79-37D633B846F1}">
+                    <asvg:svgBlip xmlns:asvg="http://schemas.microsoft.com/office/drawing/2016/SVG/main" r:embed="rId4"/>
+                  </a:ext>
+                </a:extLst>
+              </a:blip>
+              <a:stretch>
+                <a:fillRect/>
+              </a:stretch>
+            </p:blipFill>
+            <p:spPr>
+              <a:xfrm>
+                <a:off x="3522586" y="2757890"/>
+                <a:ext cx="216000" cy="216000"/>
+              </a:xfrm>
+              <a:prstGeom prst="rect">
+                <a:avLst/>
+              </a:prstGeom>
+            </p:spPr>
+          </p:pic>
+        </p:grpSp>
+        <p:sp>
+          <p:nvSpPr>
+            <p:cNvPr id="31" name="TextBox 30">
+              <a:extLst>
+                <a:ext uri="{FF2B5EF4-FFF2-40B4-BE49-F238E27FC236}">
+                  <a16:creationId xmlns:a16="http://schemas.microsoft.com/office/drawing/2014/main" id="{D5EFB941-15AC-DD75-ECC3-C633E98F9599}"/>
+                </a:ext>
+              </a:extLst>
+            </p:cNvPr>
+            <p:cNvSpPr txBox="1"/>
+            <p:nvPr/>
+          </p:nvSpPr>
+          <p:spPr>
+            <a:xfrm>
+              <a:off x="3081117" y="3113196"/>
+              <a:ext cx="886784" cy="507831"/>
+            </a:xfrm>
+            <a:prstGeom prst="rect">
+              <a:avLst/>
+            </a:prstGeom>
+            <a:noFill/>
+          </p:spPr>
+          <p:txBody>
+            <a:bodyPr wrap="square" rtlCol="0">
+              <a:spAutoFit/>
+            </a:bodyPr>
+            <a:lstStyle/>
+            <a:p>
+              <a:r>
+                <a:rPr lang="en-IN" sz="900" b="1" dirty="0"/>
+                <a:t>San Francisco California -USA</a:t>
+              </a:r>
+            </a:p>
+          </p:txBody>
+        </p:sp>
+      </p:grpSp>
+    </p:spTree>
+    <p:extLst>
+      <p:ext uri="{BB962C8B-B14F-4D97-AF65-F5344CB8AC3E}">
+        <p14:creationId xmlns:p14="http://schemas.microsoft.com/office/powerpoint/2010/main" val="3335078302"/>
       </p:ext>
     </p:extLst>
   </p:cSld>

</xml_diff>